<commit_message>
aktualizacja zajęć z gita
</commit_message>
<xml_diff>
--- a/01-ControlVersionSystem/git.pptx
+++ b/01-ControlVersionSystem/git.pptx
@@ -29,15 +29,15 @@
     <p:sldId id="259" r:id="rId17"/>
     <p:sldId id="287" r:id="rId18"/>
     <p:sldId id="278" r:id="rId19"/>
-    <p:sldId id="267" r:id="rId20"/>
-    <p:sldId id="279" r:id="rId21"/>
-    <p:sldId id="280" r:id="rId22"/>
-    <p:sldId id="281" r:id="rId23"/>
-    <p:sldId id="285" r:id="rId24"/>
-    <p:sldId id="282" r:id="rId25"/>
-    <p:sldId id="283" r:id="rId26"/>
-    <p:sldId id="284" r:id="rId27"/>
-    <p:sldId id="286" r:id="rId28"/>
+    <p:sldId id="288" r:id="rId20"/>
+    <p:sldId id="280" r:id="rId21"/>
+    <p:sldId id="281" r:id="rId22"/>
+    <p:sldId id="285" r:id="rId23"/>
+    <p:sldId id="282" r:id="rId24"/>
+    <p:sldId id="283" r:id="rId25"/>
+    <p:sldId id="284" r:id="rId26"/>
+    <p:sldId id="286" r:id="rId27"/>
+    <p:sldId id="279" r:id="rId28"/>
   </p:sldIdLst>
   <p:sldSz cx="12192000" cy="6858000"/>
   <p:notesSz cx="9144000" cy="6858000"/>
@@ -226,7 +226,7 @@
           <a:p>
             <a:fld id="{C106EF3D-C2A7-4690-80C8-C2473A856193}" type="datetimeFigureOut">
               <a:rPr lang="pl-PL" smtClean="0"/>
-              <a:t>2017-02-19</a:t>
+              <a:t>2019-03-12</a:t>
             </a:fld>
             <a:endParaRPr lang="pl-PL" dirty="0"/>
           </a:p>
@@ -391,7 +391,7 @@
           <a:p>
             <a:fld id="{85D68E81-03CD-43A1-B18B-BEB6B9439387}" type="datetimeFigureOut">
               <a:rPr lang="pl-PL" smtClean="0"/>
-              <a:t>2017-02-19</a:t>
+              <a:t>2019-03-12</a:t>
             </a:fld>
             <a:endParaRPr lang="pl-PL" dirty="0"/>
           </a:p>
@@ -787,7 +787,7 @@
           <a:p>
             <a:fld id="{F26B3061-B9B7-461F-AB67-5D66A3ABCDA5}" type="datetime1">
               <a:rPr lang="pl-PL" smtClean="0"/>
-              <a:t>2017-02-19</a:t>
+              <a:t>2019-03-12</a:t>
             </a:fld>
             <a:endParaRPr lang="pl-PL" dirty="0"/>
           </a:p>
@@ -1062,7 +1062,7 @@
           <a:p>
             <a:fld id="{A2ADAE54-1728-4B6D-BEF4-D2AEA4F8114E}" type="datetime1">
               <a:rPr lang="pl-PL" smtClean="0"/>
-              <a:t>2017-02-19</a:t>
+              <a:t>2019-03-12</a:t>
             </a:fld>
             <a:endParaRPr lang="pl-PL" dirty="0"/>
           </a:p>
@@ -1314,7 +1314,7 @@
           <a:p>
             <a:fld id="{919C3B4F-179D-44ED-90DF-E8739DC8608F}" type="datetime1">
               <a:rPr lang="pl-PL" smtClean="0"/>
-              <a:t>2017-02-19</a:t>
+              <a:t>2019-03-12</a:t>
             </a:fld>
             <a:endParaRPr lang="pl-PL" dirty="0"/>
           </a:p>
@@ -1482,7 +1482,7 @@
           <a:p>
             <a:fld id="{10A2297D-8C4B-4C5B-B66E-47E601842B03}" type="datetime1">
               <a:rPr lang="pl-PL" smtClean="0"/>
-              <a:t>2017-02-19</a:t>
+              <a:t>2019-03-12</a:t>
             </a:fld>
             <a:endParaRPr lang="pl-PL" dirty="0"/>
           </a:p>
@@ -1660,7 +1660,7 @@
           <a:p>
             <a:fld id="{94B42B50-113C-45E3-9231-B66C297B394E}" type="datetime1">
               <a:rPr lang="pl-PL" smtClean="0"/>
-              <a:t>2017-02-19</a:t>
+              <a:t>2019-03-12</a:t>
             </a:fld>
             <a:endParaRPr lang="pl-PL" dirty="0"/>
           </a:p>
@@ -1817,7 +1817,7 @@
           <a:p>
             <a:fld id="{9549FAE5-AB97-492F-ADAE-06E72624D9F3}" type="datetime1">
               <a:rPr lang="pl-PL" smtClean="0"/>
-              <a:t>2017-02-19</a:t>
+              <a:t>2019-03-12</a:t>
             </a:fld>
             <a:endParaRPr lang="pl-PL" dirty="0"/>
           </a:p>
@@ -2005,7 +2005,7 @@
           <a:p>
             <a:fld id="{9549FAE5-AB97-492F-ADAE-06E72624D9F3}" type="datetime1">
               <a:rPr lang="pl-PL" smtClean="0"/>
-              <a:t>2017-02-19</a:t>
+              <a:t>2019-03-12</a:t>
             </a:fld>
             <a:endParaRPr lang="pl-PL" dirty="0"/>
           </a:p>
@@ -2192,7 +2192,7 @@
           <a:p>
             <a:fld id="{9549FAE5-AB97-492F-ADAE-06E72624D9F3}" type="datetime1">
               <a:rPr lang="pl-PL" smtClean="0"/>
-              <a:t>2017-02-19</a:t>
+              <a:t>2019-03-12</a:t>
             </a:fld>
             <a:endParaRPr lang="pl-PL" dirty="0"/>
           </a:p>
@@ -2464,7 +2464,7 @@
           <a:p>
             <a:fld id="{ED0EDA0A-F020-4B01-AF63-E290248EFD6B}" type="datetime1">
               <a:rPr lang="pl-PL" smtClean="0"/>
-              <a:t>2017-02-19</a:t>
+              <a:t>2019-03-12</a:t>
             </a:fld>
             <a:endParaRPr lang="pl-PL" dirty="0"/>
           </a:p>
@@ -2720,7 +2720,7 @@
           <a:p>
             <a:fld id="{8B752FBA-2CC8-4F32-B36A-B6E16B4A5C14}" type="datetime1">
               <a:rPr lang="pl-PL" smtClean="0"/>
-              <a:t>2017-02-19</a:t>
+              <a:t>2019-03-12</a:t>
             </a:fld>
             <a:endParaRPr lang="pl-PL" dirty="0"/>
           </a:p>
@@ -3106,7 +3106,7 @@
           <a:p>
             <a:fld id="{3B7BA32A-B79B-42FE-906A-2593AD6A7FCC}" type="datetime1">
               <a:rPr lang="pl-PL" smtClean="0"/>
-              <a:t>2017-02-19</a:t>
+              <a:t>2019-03-12</a:t>
             </a:fld>
             <a:endParaRPr lang="pl-PL" dirty="0"/>
           </a:p>
@@ -3228,7 +3228,7 @@
           <a:p>
             <a:fld id="{3E28EDCB-CC2B-4C70-B921-DD5382BD4849}" type="datetime1">
               <a:rPr lang="pl-PL" smtClean="0"/>
-              <a:t>2017-02-19</a:t>
+              <a:t>2019-03-12</a:t>
             </a:fld>
             <a:endParaRPr lang="pl-PL" dirty="0"/>
           </a:p>
@@ -3323,7 +3323,7 @@
           <a:p>
             <a:fld id="{E960CF9B-2F8C-4614-93FE-75BD5748BF99}" type="datetime1">
               <a:rPr lang="pl-PL" smtClean="0"/>
-              <a:t>2017-02-19</a:t>
+              <a:t>2019-03-12</a:t>
             </a:fld>
             <a:endParaRPr lang="pl-PL" dirty="0"/>
           </a:p>
@@ -3539,7 +3539,7 @@
           <a:p>
             <a:fld id="{8F276EAB-4011-4C81-ACEC-B79731A9A244}" type="datetime1">
               <a:rPr lang="pl-PL" smtClean="0"/>
-              <a:t>2017-02-19</a:t>
+              <a:t>2019-03-12</a:t>
             </a:fld>
             <a:endParaRPr lang="pl-PL" dirty="0"/>
           </a:p>
@@ -4705,7 +4705,6 @@
               <a:rPr lang="pl-PL" sz="1400" dirty="0"/>
               <a:t>https://git-scm.com/doc</a:t>
             </a:r>
-            <a:endParaRPr lang="pl-PL" sz="1400" dirty="0"/>
           </a:p>
         </p:txBody>
       </p:sp>
@@ -5083,25 +5082,85 @@
         </p:nvSpPr>
         <p:spPr/>
         <p:txBody>
-          <a:bodyPr/>
-          <a:lstStyle/>
-          <a:p>
-            <a:r>
-              <a:rPr lang="en-GB" dirty="0"/>
-              <a:t>Understanding the </a:t>
-            </a:r>
-            <a:r>
-              <a:rPr lang="en-GB" dirty="0" err="1"/>
-              <a:t>Github</a:t>
-            </a:r>
-            <a:r>
-              <a:rPr lang="en-GB" dirty="0"/>
-              <a:t> Flow	</a:t>
+          <a:bodyPr>
+            <a:normAutofit/>
+          </a:bodyPr>
+          <a:lstStyle/>
+          <a:p>
+            <a:r>
+              <a:rPr lang="pl-PL" dirty="0"/>
+              <a:t>Simple </a:t>
+            </a:r>
+            <a:r>
+              <a:rPr lang="pl-PL" dirty="0" err="1"/>
+              <a:t>guide</a:t>
+            </a:r>
+            <a:br>
+              <a:rPr lang="pl-PL" dirty="0"/>
+            </a:br>
+            <a:r>
+              <a:rPr lang="pl-PL" dirty="0"/>
+              <a:t>	</a:t>
             </a:r>
             <a:r>
               <a:rPr lang="pl-PL" dirty="0">
                 <a:hlinkClick r:id="rId2"/>
               </a:rPr>
+              <a:t>http://rogerdudler.github.io/git-guide/</a:t>
+            </a:r>
+            <a:r>
+              <a:rPr lang="pl-PL" dirty="0"/>
+              <a:t> </a:t>
+            </a:r>
+          </a:p>
+          <a:p>
+            <a:r>
+              <a:rPr lang="pl-PL" dirty="0" err="1"/>
+              <a:t>Crash</a:t>
+            </a:r>
+            <a:r>
+              <a:rPr lang="pl-PL" dirty="0"/>
+              <a:t> </a:t>
+            </a:r>
+            <a:r>
+              <a:rPr lang="pl-PL" dirty="0" err="1"/>
+              <a:t>course</a:t>
+            </a:r>
+            <a:br>
+              <a:rPr lang="pl-PL" dirty="0"/>
+            </a:br>
+            <a:r>
+              <a:rPr lang="pl-PL" dirty="0"/>
+              <a:t>	</a:t>
+            </a:r>
+            <a:r>
+              <a:rPr lang="pl-PL" dirty="0">
+                <a:hlinkClick r:id="rId3"/>
+              </a:rPr>
+              <a:t>https://www.youtube.com/watch?v=SWYqp7iY_Tc</a:t>
+            </a:r>
+            <a:r>
+              <a:rPr lang="pl-PL" dirty="0"/>
+              <a:t> </a:t>
+            </a:r>
+          </a:p>
+          <a:p>
+            <a:r>
+              <a:rPr lang="en-GB" dirty="0"/>
+              <a:t>Understanding the </a:t>
+            </a:r>
+            <a:r>
+              <a:rPr lang="en-GB" dirty="0" err="1"/>
+              <a:t>Github</a:t>
+            </a:r>
+            <a:r>
+              <a:rPr lang="en-GB" dirty="0"/>
+              <a:t> Flow	</a:t>
+            </a:r>
+            <a:r>
+              <a:rPr lang="pl-PL" dirty="0">
+                <a:hlinkClick r:id="rId4"/>
+              </a:rPr>
               <a:t>https://guides.github.com/introduction/flow/</a:t>
             </a:r>
             <a:endParaRPr lang="en-US" dirty="0"/>
@@ -5111,16 +5170,16 @@
               <a:rPr lang="en-GB" dirty="0"/>
               <a:t>Become a git guru</a:t>
             </a:r>
-            <a:endParaRPr lang="en-US" dirty="0"/>
-          </a:p>
-          <a:p>
-            <a:r>
-              <a:rPr lang="en-US" dirty="0"/>
+            <a:br>
+              <a:rPr lang="pl-PL" dirty="0"/>
+            </a:br>
+            <a:r>
+              <a:rPr lang="pl-PL" dirty="0"/>
               <a:t>	</a:t>
             </a:r>
             <a:r>
               <a:rPr lang="en-US" dirty="0">
-                <a:hlinkClick r:id="rId3"/>
+                <a:hlinkClick r:id="rId5"/>
               </a:rPr>
               <a:t>https://www.atlassian.com/git/tutorials</a:t>
             </a:r>
@@ -5336,12 +5395,12 @@
       </p:grpSpPr>
       <p:sp>
         <p:nvSpPr>
-          <p:cNvPr id="2" name="Tytuł 1"/>
-          <p:cNvSpPr>
-            <a:spLocks noGrp="1"/>
-          </p:cNvSpPr>
-          <p:nvPr>
-            <p:ph type="title"/>
+          <p:cNvPr id="6" name="Symbol zastępczy zawartości 5"/>
+          <p:cNvSpPr>
+            <a:spLocks noGrp="1"/>
+          </p:cNvSpPr>
+          <p:nvPr>
+            <p:ph idx="1"/>
           </p:nvPr>
         </p:nvSpPr>
         <p:spPr/>
@@ -5351,14 +5410,31 @@
           <a:p>
             <a:r>
               <a:rPr lang="en-GB" noProof="0" dirty="0"/>
-              <a:t>Master git basics</a:t>
-            </a:r>
-          </a:p>
-        </p:txBody>
-      </p:sp>
-      <p:sp>
-        <p:nvSpPr>
-          <p:cNvPr id="3" name="Symbol zastępczy numeru slajdu 2"/>
+              <a:t>On the </a:t>
+            </a:r>
+            <a:r>
+              <a:rPr lang="en-GB" noProof="0" dirty="0" err="1"/>
+              <a:t>github</a:t>
+            </a:r>
+            <a:r>
+              <a:rPr lang="en-GB" noProof="0" dirty="0"/>
+              <a:t>, create your personal account (if you do not have yet)</a:t>
+            </a:r>
+          </a:p>
+          <a:p>
+            <a:pPr marL="457200" lvl="1" indent="0">
+              <a:buNone/>
+            </a:pPr>
+            <a:r>
+              <a:rPr lang="en-GB" noProof="0" dirty="0"/>
+              <a:t>https://github.com/</a:t>
+            </a:r>
+          </a:p>
+        </p:txBody>
+      </p:sp>
+      <p:sp>
+        <p:nvSpPr>
+          <p:cNvPr id="4" name="Symbol zastępczy numeru slajdu 3"/>
           <p:cNvSpPr>
             <a:spLocks noGrp="1"/>
           </p:cNvSpPr>
@@ -5381,73 +5457,22 @@
       </p:sp>
       <p:sp>
         <p:nvSpPr>
-          <p:cNvPr id="4" name="pole tekstowe 3"/>
-          <p:cNvSpPr txBox="1"/>
-          <p:nvPr/>
-        </p:nvSpPr>
-        <p:spPr>
-          <a:xfrm>
-            <a:off x="4058648" y="2542265"/>
-            <a:ext cx="4074705" cy="2585323"/>
-          </a:xfrm>
-          <a:prstGeom prst="rect">
-            <a:avLst/>
-          </a:prstGeom>
-          <a:noFill/>
-        </p:spPr>
-        <p:txBody>
-          <a:bodyPr wrap="none" rtlCol="0">
-            <a:spAutoFit/>
-          </a:bodyPr>
-          <a:lstStyle/>
-          <a:p>
-            <a:pPr algn="ctr"/>
-            <a:r>
-              <a:rPr lang="pl-PL" sz="5400" b="1" dirty="0"/>
-              <a:t>Tutorial:</a:t>
-            </a:r>
-            <a:br>
-              <a:rPr lang="pl-PL" sz="5400" b="1" dirty="0"/>
-            </a:br>
-            <a:r>
-              <a:rPr lang="pl-PL" sz="5400" b="1" dirty="0"/>
-              <a:t>Learning git</a:t>
-            </a:r>
-            <a:br>
-              <a:rPr lang="pl-PL" sz="5400" b="1" dirty="0"/>
-            </a:br>
-            <a:r>
-              <a:rPr lang="pl-PL" sz="5400" b="1" dirty="0"/>
-              <a:t>in 15 minutes</a:t>
-            </a:r>
-          </a:p>
-        </p:txBody>
-      </p:sp>
-      <p:sp>
-        <p:nvSpPr>
-          <p:cNvPr id="5" name="pole tekstowe 4"/>
-          <p:cNvSpPr txBox="1"/>
-          <p:nvPr/>
-        </p:nvSpPr>
-        <p:spPr>
-          <a:xfrm>
-            <a:off x="4457923" y="5513294"/>
-            <a:ext cx="3276153" cy="307777"/>
-          </a:xfrm>
-          <a:prstGeom prst="rect">
-            <a:avLst/>
-          </a:prstGeom>
-          <a:noFill/>
-        </p:spPr>
-        <p:txBody>
-          <a:bodyPr wrap="none" rtlCol="0">
-            <a:spAutoFit/>
-          </a:bodyPr>
-          <a:lstStyle/>
-          <a:p>
-            <a:r>
-              <a:rPr lang="pl-PL" sz="1400" dirty="0"/>
-              <a:t>https://try.github.io/levels/1/challenges/1</a:t>
+          <p:cNvPr id="5" name="Tytuł 4"/>
+          <p:cNvSpPr>
+            <a:spLocks noGrp="1"/>
+          </p:cNvSpPr>
+          <p:nvPr>
+            <p:ph type="title"/>
+          </p:nvPr>
+        </p:nvSpPr>
+        <p:spPr/>
+        <p:txBody>
+          <a:bodyPr/>
+          <a:lstStyle/>
+          <a:p>
+            <a:r>
+              <a:rPr lang="en-GB" noProof="0" dirty="0"/>
+              <a:t>Create github account</a:t>
             </a:r>
           </a:p>
         </p:txBody>
@@ -5455,7 +5480,7 @@
     </p:spTree>
     <p:extLst>
       <p:ext uri="{BB962C8B-B14F-4D97-AF65-F5344CB8AC3E}">
-        <p14:creationId xmlns:p14="http://schemas.microsoft.com/office/powerpoint/2010/main" val="1800967386"/>
+        <p14:creationId xmlns:p14="http://schemas.microsoft.com/office/powerpoint/2010/main" val="36486254"/>
       </p:ext>
     </p:extLst>
   </p:cSld>
@@ -5613,7 +5638,7 @@
       </p:grpSpPr>
       <p:sp>
         <p:nvSpPr>
-          <p:cNvPr id="6" name="Symbol zastępczy zawartości 5"/>
+          <p:cNvPr id="2" name="Symbol zastępczy zawartości 1"/>
           <p:cNvSpPr>
             <a:spLocks noGrp="1"/>
           </p:cNvSpPr>
@@ -5623,30 +5648,167 @@
         </p:nvSpPr>
         <p:spPr/>
         <p:txBody>
-          <a:bodyPr/>
-          <a:lstStyle/>
-          <a:p>
-            <a:r>
-              <a:rPr lang="en-GB" noProof="0" dirty="0"/>
+          <a:bodyPr>
+            <a:normAutofit lnSpcReduction="10000"/>
+          </a:bodyPr>
+          <a:lstStyle/>
+          <a:p>
+            <a:r>
+              <a:rPr lang="en-GB" dirty="0"/>
               <a:t>On the </a:t>
             </a:r>
             <a:r>
-              <a:rPr lang="en-GB" noProof="0" dirty="0" err="1"/>
+              <a:rPr lang="en-GB" dirty="0" err="1"/>
               <a:t>github</a:t>
             </a:r>
             <a:r>
-              <a:rPr lang="en-GB" noProof="0" dirty="0"/>
-              <a:t>, create your personal account (if you do not have yet)</a:t>
-            </a:r>
-          </a:p>
-          <a:p>
-            <a:pPr marL="457200" lvl="1" indent="0">
+              <a:rPr lang="en-GB" dirty="0"/>
+              <a:t>, create </a:t>
+            </a:r>
+            <a:r>
+              <a:rPr lang="pl-PL" u="sng" dirty="0" err="1"/>
+              <a:t>an</a:t>
+            </a:r>
+            <a:r>
+              <a:rPr lang="en-GB" u="sng" dirty="0"/>
+              <a:t> empty</a:t>
+            </a:r>
+            <a:r>
+              <a:rPr lang="en-GB" dirty="0"/>
+              <a:t> </a:t>
+            </a:r>
+            <a:r>
+              <a:rPr lang="en-GB" dirty="0" err="1"/>
+              <a:t>MyFirstProject</a:t>
+            </a:r>
+            <a:r>
+              <a:rPr lang="en-GB" dirty="0"/>
+              <a:t> repository. Familiarise yourself with the Quick setup info (</a:t>
+            </a:r>
+            <a:r>
+              <a:rPr lang="en-GB" dirty="0" err="1"/>
+              <a:t>MyFirstProject</a:t>
+            </a:r>
+            <a:r>
+              <a:rPr lang="en-GB" dirty="0"/>
+              <a:t> repository code tab).</a:t>
+            </a:r>
+          </a:p>
+          <a:p>
+            <a:r>
+              <a:rPr lang="en-GB" dirty="0"/>
+              <a:t>On the computer desktop, create </a:t>
+            </a:r>
+            <a:r>
+              <a:rPr lang="en-GB" dirty="0" err="1"/>
+              <a:t>MyFirstProject</a:t>
+            </a:r>
+            <a:r>
+              <a:rPr lang="en-GB" dirty="0"/>
+              <a:t> folder with three empty files: a.txt, b.txt, and c.txt. Initialise a git repository in the </a:t>
+            </a:r>
+            <a:r>
+              <a:rPr lang="en-GB" dirty="0" err="1"/>
+              <a:t>MyFirstProject</a:t>
+            </a:r>
+            <a:r>
+              <a:rPr lang="en-GB" dirty="0"/>
+              <a:t> folder. Then for the repository, set user identity.</a:t>
+            </a:r>
+          </a:p>
+          <a:p>
+            <a:r>
+              <a:rPr lang="en-GB" dirty="0"/>
+              <a:t>Start tracking files, and then show repository status.</a:t>
+            </a:r>
+          </a:p>
+          <a:p>
+            <a:r>
+              <a:rPr lang="en-GB" dirty="0"/>
+              <a:t>In </a:t>
+            </a:r>
+            <a:r>
+              <a:rPr lang="en-GB" dirty="0" err="1"/>
+              <a:t>MyFirstProject</a:t>
+            </a:r>
+            <a:r>
+              <a:rPr lang="en-GB" dirty="0"/>
+              <a:t>, add an empty file author.txt and start tracking the file. Show repository status.</a:t>
+            </a:r>
+          </a:p>
+          <a:p>
+            <a:r>
+              <a:rPr lang="en-GB" dirty="0"/>
+              <a:t>In the first line of the file, add your name and surname, and then show repository status.</a:t>
+            </a:r>
+          </a:p>
+          <a:p>
+            <a:r>
+              <a:rPr lang="en-GB" dirty="0"/>
+              <a:t>Add files to the staging area. Then show repository status.</a:t>
+            </a:r>
+          </a:p>
+          <a:p>
+            <a:r>
+              <a:rPr lang="en-GB" dirty="0"/>
+              <a:t>Commit changes . Use ‘My first commit’ message. Then show commit logs. Show repository status.</a:t>
+            </a:r>
+          </a:p>
+          <a:p>
+            <a:r>
+              <a:rPr lang="en-GB" dirty="0"/>
+              <a:t>Add remote and push changes from local to remote repository (</a:t>
+            </a:r>
+            <a:r>
+              <a:rPr lang="en-GB" dirty="0" err="1"/>
+              <a:t>github</a:t>
+            </a:r>
+            <a:r>
+              <a:rPr lang="en-GB" dirty="0"/>
+              <a:t>).</a:t>
+            </a:r>
+          </a:p>
+          <a:p>
+            <a:r>
+              <a:rPr lang="en-GB" dirty="0"/>
+              <a:t>On the </a:t>
+            </a:r>
+            <a:r>
+              <a:rPr lang="en-GB" dirty="0" err="1"/>
+              <a:t>github</a:t>
+            </a:r>
+            <a:r>
+              <a:rPr lang="en-GB" dirty="0"/>
+              <a:t>, check out the </a:t>
+            </a:r>
+            <a:r>
+              <a:rPr lang="en-GB" dirty="0" err="1"/>
+              <a:t>MyFirstProject</a:t>
+            </a:r>
+            <a:r>
+              <a:rPr lang="en-GB" dirty="0"/>
+              <a:t> repository contents (should be the same as local repo).</a:t>
+            </a:r>
+          </a:p>
+          <a:p>
+            <a:r>
+              <a:rPr lang="en-GB" dirty="0"/>
+              <a:t>On the computer desktop, remove the </a:t>
+            </a:r>
+            <a:r>
+              <a:rPr lang="en-GB" dirty="0" err="1"/>
+              <a:t>MyFirstProject</a:t>
+            </a:r>
+            <a:r>
+              <a:rPr lang="en-GB" dirty="0"/>
+              <a:t> folder.</a:t>
+            </a:r>
+          </a:p>
+          <a:p>
+            <a:pPr marL="0" indent="0">
               <a:buNone/>
             </a:pPr>
-            <a:r>
-              <a:rPr lang="en-GB" noProof="0" dirty="0"/>
-              <a:t>https://github.com/</a:t>
-            </a:r>
+            <a:endParaRPr lang="pl-PL" dirty="0"/>
           </a:p>
         </p:txBody>
       </p:sp>
@@ -5690,7 +5852,7 @@
           <a:p>
             <a:r>
               <a:rPr lang="en-GB" noProof="0" dirty="0"/>
-              <a:t>Create github account</a:t>
+              <a:t>Create repository from scratch</a:t>
             </a:r>
           </a:p>
         </p:txBody>
@@ -5698,7 +5860,7 @@
     </p:spTree>
     <p:extLst>
       <p:ext uri="{BB962C8B-B14F-4D97-AF65-F5344CB8AC3E}">
-        <p14:creationId xmlns:p14="http://schemas.microsoft.com/office/powerpoint/2010/main" val="1205715426"/>
+        <p14:creationId xmlns:p14="http://schemas.microsoft.com/office/powerpoint/2010/main" val="1568664789"/>
       </p:ext>
     </p:extLst>
   </p:cSld>
@@ -5737,30 +5899,12 @@
         </p:nvSpPr>
         <p:spPr/>
         <p:txBody>
-          <a:bodyPr>
-            <a:normAutofit lnSpcReduction="10000"/>
-          </a:bodyPr>
+          <a:bodyPr/>
           <a:lstStyle/>
           <a:p>
             <a:r>
               <a:rPr lang="en-GB" dirty="0"/>
-              <a:t>On the </a:t>
-            </a:r>
-            <a:r>
-              <a:rPr lang="en-GB" dirty="0" err="1"/>
-              <a:t>github</a:t>
-            </a:r>
-            <a:r>
-              <a:rPr lang="en-GB" dirty="0"/>
-              <a:t>, create </a:t>
-            </a:r>
-            <a:r>
-              <a:rPr lang="en-GB" u="sng" dirty="0"/>
-              <a:t>the empty</a:t>
-            </a:r>
-            <a:r>
-              <a:rPr lang="en-GB" dirty="0"/>
-              <a:t> </a:t>
+              <a:t>On the computer desktop, clone the </a:t>
             </a:r>
             <a:r>
               <a:rPr lang="en-GB" dirty="0" err="1"/>
@@ -5768,7 +5912,62 @@
             </a:r>
             <a:r>
               <a:rPr lang="en-GB" dirty="0"/>
-              <a:t> repository. Familiarise yourself with the Quick setup info (</a:t>
+              <a:t> remote repository into a local folder.</a:t>
+            </a:r>
+          </a:p>
+          <a:p>
+            <a:r>
+              <a:rPr lang="en-GB" dirty="0"/>
+              <a:t>Complete author.txt with your email.</a:t>
+            </a:r>
+          </a:p>
+          <a:p>
+            <a:r>
+              <a:rPr lang="en-GB" dirty="0"/>
+              <a:t>Commit changes. Use ‘Added email address’ message.</a:t>
+            </a:r>
+          </a:p>
+          <a:p>
+            <a:r>
+              <a:rPr lang="en-US" dirty="0"/>
+              <a:t>Push changes from local to remote repository (</a:t>
+            </a:r>
+            <a:r>
+              <a:rPr lang="en-US" dirty="0" err="1"/>
+              <a:t>github</a:t>
+            </a:r>
+            <a:r>
+              <a:rPr lang="en-US" dirty="0"/>
+              <a:t>).</a:t>
+            </a:r>
+            <a:endParaRPr lang="en-GB" dirty="0"/>
+          </a:p>
+          <a:p>
+            <a:r>
+              <a:rPr lang="en-US" dirty="0"/>
+              <a:t>On the </a:t>
+            </a:r>
+            <a:r>
+              <a:rPr lang="en-US" dirty="0" err="1"/>
+              <a:t>github</a:t>
+            </a:r>
+            <a:r>
+              <a:rPr lang="en-US" dirty="0"/>
+              <a:t>, check out the </a:t>
+            </a:r>
+            <a:r>
+              <a:rPr lang="en-US" dirty="0" err="1"/>
+              <a:t>MyFirstProject</a:t>
+            </a:r>
+            <a:r>
+              <a:rPr lang="en-US" dirty="0"/>
+              <a:t> repository (author.txt content). </a:t>
+            </a:r>
+          </a:p>
+          <a:p>
+            <a:r>
+              <a:rPr lang="en-GB" dirty="0"/>
+              <a:t>On the computer desktop, delete </a:t>
             </a:r>
             <a:r>
               <a:rPr lang="en-GB" dirty="0" err="1"/>
@@ -5776,123 +5975,8 @@
             </a:r>
             <a:r>
               <a:rPr lang="en-GB" dirty="0"/>
-              <a:t> repository code tab).</a:t>
-            </a:r>
-          </a:p>
-          <a:p>
-            <a:r>
-              <a:rPr lang="en-GB" dirty="0"/>
-              <a:t>On the computer desktop, create </a:t>
-            </a:r>
-            <a:r>
-              <a:rPr lang="en-GB" dirty="0" err="1"/>
-              <a:t>MyFirstProject</a:t>
-            </a:r>
-            <a:r>
-              <a:rPr lang="en-GB" dirty="0"/>
-              <a:t> folder with three empty files: a.txt, b.txt, and c.txt. Initialise a git repository in the </a:t>
-            </a:r>
-            <a:r>
-              <a:rPr lang="en-GB" dirty="0" err="1"/>
-              <a:t>MyFirstProject</a:t>
-            </a:r>
-            <a:r>
-              <a:rPr lang="en-GB" dirty="0"/>
-              <a:t> folder. Then for the repository, set user identity.</a:t>
-            </a:r>
-          </a:p>
-          <a:p>
-            <a:r>
-              <a:rPr lang="en-GB" dirty="0"/>
-              <a:t>Start tracking files, and then show repository status.</a:t>
-            </a:r>
-          </a:p>
-          <a:p>
-            <a:r>
-              <a:rPr lang="en-GB" dirty="0"/>
-              <a:t>In </a:t>
-            </a:r>
-            <a:r>
-              <a:rPr lang="en-GB" dirty="0" err="1"/>
-              <a:t>MyFirstProject</a:t>
-            </a:r>
-            <a:r>
-              <a:rPr lang="en-GB" dirty="0"/>
-              <a:t>, add an empty file author.txt and start tracking the file. Show repository status.</a:t>
-            </a:r>
-          </a:p>
-          <a:p>
-            <a:r>
-              <a:rPr lang="en-GB" dirty="0"/>
-              <a:t>In the first line of the file, add your name and surname, and then show repository status.</a:t>
-            </a:r>
-          </a:p>
-          <a:p>
-            <a:r>
-              <a:rPr lang="en-GB" dirty="0"/>
-              <a:t>Add files to the staging area. Then show repository status.</a:t>
-            </a:r>
-          </a:p>
-          <a:p>
-            <a:r>
-              <a:rPr lang="en-GB" dirty="0"/>
-              <a:t>Commit changes . Use ‘My first commit’ message. Then show commit logs. Show repository status.</a:t>
-            </a:r>
-          </a:p>
-          <a:p>
-            <a:r>
-              <a:rPr lang="en-GB" dirty="0"/>
-              <a:t>Add remote and push changes from local to remote repository (</a:t>
-            </a:r>
-            <a:r>
-              <a:rPr lang="en-GB" dirty="0" err="1"/>
-              <a:t>github</a:t>
-            </a:r>
-            <a:r>
-              <a:rPr lang="en-GB" dirty="0"/>
-              <a:t>).</a:t>
-            </a:r>
-          </a:p>
-          <a:p>
-            <a:r>
-              <a:rPr lang="en-GB" dirty="0"/>
-              <a:t>On the </a:t>
-            </a:r>
-            <a:r>
-              <a:rPr lang="en-GB" dirty="0" err="1"/>
-              <a:t>github</a:t>
-            </a:r>
-            <a:r>
-              <a:rPr lang="en-GB" dirty="0"/>
-              <a:t>, check out the </a:t>
-            </a:r>
-            <a:r>
-              <a:rPr lang="en-GB" dirty="0" err="1"/>
-              <a:t>MyFirstProject</a:t>
-            </a:r>
-            <a:r>
-              <a:rPr lang="en-GB" dirty="0"/>
-              <a:t> repository contents (should be the same as local repo).</a:t>
-            </a:r>
-          </a:p>
-          <a:p>
-            <a:r>
-              <a:rPr lang="en-GB" dirty="0"/>
-              <a:t>On the computer desktop, remove the </a:t>
-            </a:r>
-            <a:r>
-              <a:rPr lang="en-GB" dirty="0" err="1"/>
-              <a:t>MyFirstProject</a:t>
-            </a:r>
-            <a:r>
-              <a:rPr lang="en-GB" dirty="0"/>
               <a:t> folder.</a:t>
             </a:r>
-          </a:p>
-          <a:p>
-            <a:pPr marL="0" indent="0">
-              <a:buNone/>
-            </a:pPr>
             <a:endParaRPr lang="pl-PL" dirty="0"/>
           </a:p>
         </p:txBody>
@@ -5937,7 +6021,7 @@
           <a:p>
             <a:r>
               <a:rPr lang="en-GB" noProof="0" dirty="0"/>
-              <a:t>Create repository from scratch</a:t>
+              <a:t>Clone existing remote repository</a:t>
             </a:r>
           </a:p>
         </p:txBody>
@@ -5945,7 +6029,7 @@
     </p:spTree>
     <p:extLst>
       <p:ext uri="{BB962C8B-B14F-4D97-AF65-F5344CB8AC3E}">
-        <p14:creationId xmlns:p14="http://schemas.microsoft.com/office/powerpoint/2010/main" val="1568664789"/>
+        <p14:creationId xmlns:p14="http://schemas.microsoft.com/office/powerpoint/2010/main" val="568808491"/>
       </p:ext>
     </p:extLst>
   </p:cSld>
@@ -5987,88 +6071,54 @@
           <a:bodyPr/>
           <a:lstStyle/>
           <a:p>
+            <a:pPr marL="0" indent="0">
+              <a:buNone/>
+            </a:pPr>
             <a:r>
               <a:rPr lang="en-GB" dirty="0"/>
-              <a:t>On the computer desktop, clone the </a:t>
-            </a:r>
-            <a:r>
-              <a:rPr lang="en-GB" dirty="0" err="1"/>
-              <a:t>MyFirstProject</a:t>
+              <a:t>Do the ‘</a:t>
+            </a:r>
+            <a:r>
+              <a:rPr lang="pl-PL" dirty="0" err="1"/>
+              <a:t>Create</a:t>
+            </a:r>
+            <a:r>
+              <a:rPr lang="pl-PL" dirty="0"/>
+              <a:t> </a:t>
+            </a:r>
+            <a:r>
+              <a:rPr lang="pl-PL" dirty="0" err="1"/>
+              <a:t>repository</a:t>
+            </a:r>
+            <a:r>
+              <a:rPr lang="pl-PL" dirty="0"/>
+              <a:t> from </a:t>
+            </a:r>
+            <a:r>
+              <a:rPr lang="pl-PL" dirty="0" err="1"/>
+              <a:t>scratch</a:t>
             </a:r>
             <a:r>
               <a:rPr lang="en-GB" dirty="0"/>
-              <a:t> remote repository into a local folder.</a:t>
-            </a:r>
-          </a:p>
-          <a:p>
+              <a:t>’ assignment. Instead of command line tool, use git Graphical User Interface (</a:t>
+            </a:r>
+            <a:r>
+              <a:rPr lang="pl-PL" dirty="0"/>
+              <a:t>git </a:t>
+            </a:r>
             <a:r>
               <a:rPr lang="en-GB" dirty="0"/>
-              <a:t>Complete author.txt with your email.</a:t>
-            </a:r>
-          </a:p>
-          <a:p>
-            <a:r>
-              <a:rPr lang="en-GB" dirty="0"/>
-              <a:t>Commit changes. Use ‘Added email address’ message.</a:t>
-            </a:r>
-          </a:p>
-          <a:p>
-            <a:r>
-              <a:rPr lang="en-US" dirty="0"/>
-              <a:t>Push changes from local to remote repository (</a:t>
-            </a:r>
-            <a:r>
-              <a:rPr lang="en-US" dirty="0" err="1"/>
-              <a:t>github</a:t>
-            </a:r>
-            <a:r>
-              <a:rPr lang="en-US" dirty="0"/>
-              <a:t>).</a:t>
-            </a:r>
-            <a:endParaRPr lang="en-GB" dirty="0"/>
-          </a:p>
-          <a:p>
-            <a:r>
-              <a:rPr lang="en-US" dirty="0"/>
-              <a:t>On the </a:t>
-            </a:r>
-            <a:r>
-              <a:rPr lang="en-US" dirty="0" err="1"/>
-              <a:t>github</a:t>
-            </a:r>
-            <a:r>
-              <a:rPr lang="en-US" dirty="0"/>
-              <a:t>, check out the </a:t>
-            </a:r>
-            <a:r>
-              <a:rPr lang="en-US" dirty="0" err="1"/>
-              <a:t>MyFirstProject</a:t>
-            </a:r>
-            <a:r>
-              <a:rPr lang="en-US" dirty="0"/>
-              <a:t> repository (author.txt content). </a:t>
-            </a:r>
-          </a:p>
-          <a:p>
-            <a:r>
-              <a:rPr lang="en-GB" dirty="0"/>
-              <a:t>On the computer desktop, delete </a:t>
-            </a:r>
-            <a:r>
-              <a:rPr lang="en-GB" dirty="0" err="1"/>
-              <a:t>MyFirstProject</a:t>
-            </a:r>
-            <a:r>
-              <a:rPr lang="en-GB" dirty="0"/>
-              <a:t> folder.</a:t>
-            </a:r>
-            <a:endParaRPr lang="pl-PL" dirty="0"/>
-          </a:p>
-        </p:txBody>
-      </p:sp>
-      <p:sp>
-        <p:nvSpPr>
-          <p:cNvPr id="4" name="Symbol zastępczy numeru slajdu 3"/>
+              <a:t>GUI).</a:t>
+            </a:r>
+          </a:p>
+          <a:p>
+            <a:endParaRPr lang="pl-PL" dirty="0"/>
+          </a:p>
+        </p:txBody>
+      </p:sp>
+      <p:sp>
+        <p:nvSpPr>
+          <p:cNvPr id="3" name="Symbol zastępczy numeru slajdu 2"/>
           <p:cNvSpPr>
             <a:spLocks noGrp="1"/>
           </p:cNvSpPr>
@@ -6091,7 +6141,7 @@
       </p:sp>
       <p:sp>
         <p:nvSpPr>
-          <p:cNvPr id="5" name="Tytuł 4"/>
+          <p:cNvPr id="4" name="Tytuł 3"/>
           <p:cNvSpPr>
             <a:spLocks noGrp="1"/>
           </p:cNvSpPr>
@@ -6105,16 +6155,17 @@
           <a:lstStyle/>
           <a:p>
             <a:r>
-              <a:rPr lang="en-GB" noProof="0" dirty="0"/>
-              <a:t>Clone existing remote repository</a:t>
-            </a:r>
+              <a:rPr lang="en-GB" dirty="0"/>
+              <a:t>Use git GUI</a:t>
+            </a:r>
+            <a:endParaRPr lang="pl-PL" dirty="0"/>
           </a:p>
         </p:txBody>
       </p:sp>
     </p:spTree>
     <p:extLst>
       <p:ext uri="{BB962C8B-B14F-4D97-AF65-F5344CB8AC3E}">
-        <p14:creationId xmlns:p14="http://schemas.microsoft.com/office/powerpoint/2010/main" val="568808491"/>
+        <p14:creationId xmlns:p14="http://schemas.microsoft.com/office/powerpoint/2010/main" val="1576120169"/>
       </p:ext>
     </p:extLst>
   </p:cSld>
@@ -6153,43 +6204,93 @@
         </p:nvSpPr>
         <p:spPr/>
         <p:txBody>
-          <a:bodyPr/>
-          <a:lstStyle/>
-          <a:p>
-            <a:pPr marL="0" indent="0">
-              <a:buNone/>
-            </a:pPr>
+          <a:bodyPr>
+            <a:normAutofit/>
+          </a:bodyPr>
+          <a:lstStyle/>
+          <a:p>
             <a:r>
               <a:rPr lang="en-GB" dirty="0"/>
-              <a:t>Do the ‘</a:t>
-            </a:r>
-            <a:r>
-              <a:rPr lang="pl-PL" dirty="0" err="1"/>
-              <a:t>Create</a:t>
-            </a:r>
-            <a:r>
-              <a:rPr lang="pl-PL" dirty="0"/>
-              <a:t> </a:t>
-            </a:r>
-            <a:r>
-              <a:rPr lang="pl-PL" dirty="0" err="1"/>
-              <a:t>repository</a:t>
-            </a:r>
-            <a:r>
-              <a:rPr lang="pl-PL" dirty="0"/>
-              <a:t> from </a:t>
-            </a:r>
-            <a:r>
-              <a:rPr lang="pl-PL" dirty="0" err="1"/>
-              <a:t>scratch</a:t>
+              <a:t>Clone </a:t>
+            </a:r>
+            <a:r>
+              <a:rPr lang="en-GB" dirty="0" err="1"/>
+              <a:t>MyFirstProject</a:t>
             </a:r>
             <a:r>
               <a:rPr lang="en-GB" dirty="0"/>
-              <a:t>’ assignment. Instead of command line tool, use git Graphical User Interface (GUI).</a:t>
-            </a:r>
-          </a:p>
-          <a:p>
-            <a:endParaRPr lang="pl-PL" dirty="0"/>
+              <a:t>.</a:t>
+            </a:r>
+          </a:p>
+          <a:p>
+            <a:r>
+              <a:rPr lang="en-GB" dirty="0"/>
+              <a:t>Display branch list. What is the name of the default branch?</a:t>
+            </a:r>
+          </a:p>
+          <a:p>
+            <a:r>
+              <a:rPr lang="en-GB" dirty="0"/>
+              <a:t>Add a new branch ‘interests’. Then display branch list (please note that only one branch is active).</a:t>
+            </a:r>
+          </a:p>
+          <a:p>
+            <a:r>
+              <a:rPr lang="en-GB" dirty="0"/>
+              <a:t>Switch to ‘interests’ branch.</a:t>
+            </a:r>
+          </a:p>
+          <a:p>
+            <a:r>
+              <a:rPr lang="en-GB" dirty="0"/>
+              <a:t>Add new file myinterests.txt. Type two-three sentences about your hobby.</a:t>
+            </a:r>
+          </a:p>
+          <a:p>
+            <a:r>
+              <a:rPr lang="en-GB" dirty="0"/>
+              <a:t>Commit changes.</a:t>
+            </a:r>
+            <a:endParaRPr lang="pl-PL" dirty="0"/>
+          </a:p>
+          <a:p>
+            <a:r>
+              <a:rPr lang="en-GB" dirty="0"/>
+              <a:t>Switch between ‘master’ and ‘interests’ branches. Can you see the differences in the working directory?</a:t>
+            </a:r>
+          </a:p>
+          <a:p>
+            <a:r>
+              <a:rPr lang="en-GB" dirty="0"/>
+              <a:t>Merge ‘interests’ branch into ‘master’.</a:t>
+            </a:r>
+          </a:p>
+          <a:p>
+            <a:r>
+              <a:rPr lang="en-GB" dirty="0"/>
+              <a:t>Check the differences in the working directory.</a:t>
+            </a:r>
+          </a:p>
+          <a:p>
+            <a:r>
+              <a:rPr lang="en-GB" dirty="0"/>
+              <a:t>Remove ‘interests’ branch.</a:t>
+            </a:r>
+          </a:p>
+          <a:p>
+            <a:r>
+              <a:rPr lang="en-US" dirty="0"/>
+              <a:t>Push changes from local to remote repository (</a:t>
+            </a:r>
+            <a:r>
+              <a:rPr lang="en-US" dirty="0" err="1"/>
+              <a:t>github</a:t>
+            </a:r>
+            <a:r>
+              <a:rPr lang="en-US" dirty="0"/>
+              <a:t>) and check the remote repo content.</a:t>
+            </a:r>
+            <a:endParaRPr lang="en-GB" dirty="0"/>
           </a:p>
         </p:txBody>
       </p:sp>
@@ -6233,7 +6334,7 @@
           <a:p>
             <a:r>
               <a:rPr lang="en-GB" dirty="0"/>
-              <a:t>Use git GUI</a:t>
+              <a:t>Create and merge branches </a:t>
             </a:r>
             <a:endParaRPr lang="pl-PL" dirty="0"/>
           </a:p>
@@ -6242,7 +6343,7 @@
     </p:spTree>
     <p:extLst>
       <p:ext uri="{BB962C8B-B14F-4D97-AF65-F5344CB8AC3E}">
-        <p14:creationId xmlns:p14="http://schemas.microsoft.com/office/powerpoint/2010/main" val="1576120169"/>
+        <p14:creationId xmlns:p14="http://schemas.microsoft.com/office/powerpoint/2010/main" val="1651116503"/>
       </p:ext>
     </p:extLst>
   </p:cSld>
@@ -6282,17 +6383,117 @@
         <p:spPr/>
         <p:txBody>
           <a:bodyPr>
-            <a:normAutofit/>
+            <a:normAutofit lnSpcReduction="10000"/>
           </a:bodyPr>
           <a:lstStyle/>
           <a:p>
             <a:r>
               <a:rPr lang="en-GB" dirty="0"/>
-              <a:t>Clone </a:t>
+              <a:t>On your local computer, create a new repository Books.</a:t>
+            </a:r>
+          </a:p>
+          <a:p>
+            <a:r>
+              <a:rPr lang="en-GB" dirty="0"/>
+              <a:t>In the repo, add a new file books.txt with your three favourite book titles, on separate lines.</a:t>
+            </a:r>
+          </a:p>
+          <a:p>
+            <a:r>
+              <a:rPr lang="en-GB" dirty="0"/>
+              <a:t>Commit changes and push the repo to the </a:t>
             </a:r>
             <a:r>
               <a:rPr lang="en-GB" dirty="0" err="1"/>
-              <a:t>MyFirstProject</a:t>
+              <a:t>github</a:t>
+            </a:r>
+            <a:r>
+              <a:rPr lang="en-GB" dirty="0"/>
+              <a:t>. Make sure to create an empty remote repo before.</a:t>
+            </a:r>
+          </a:p>
+          <a:p>
+            <a:r>
+              <a:rPr lang="en-GB" dirty="0"/>
+              <a:t>On the </a:t>
+            </a:r>
+            <a:r>
+              <a:rPr lang="en-GB" dirty="0" err="1"/>
+              <a:t>github</a:t>
+            </a:r>
+            <a:r>
+              <a:rPr lang="en-GB" dirty="0"/>
+              <a:t>, add your colleague as the repository collaborator.</a:t>
+            </a:r>
+          </a:p>
+          <a:p>
+            <a:r>
+              <a:rPr lang="en-GB" dirty="0"/>
+              <a:t>Ask your collaborator to</a:t>
+            </a:r>
+          </a:p>
+          <a:p>
+            <a:pPr lvl="1"/>
+            <a:r>
+              <a:rPr lang="en-GB" dirty="0"/>
+              <a:t>clone the repository</a:t>
+            </a:r>
+          </a:p>
+          <a:p>
+            <a:pPr lvl="1"/>
+            <a:r>
+              <a:rPr lang="en-GB" dirty="0"/>
+              <a:t>add bookstores.txt with two names and URLs of the Internet bookstores</a:t>
+            </a:r>
+          </a:p>
+          <a:p>
+            <a:pPr lvl="1"/>
+            <a:r>
+              <a:rPr lang="en-GB" dirty="0"/>
+              <a:t>commit changes and push them to the </a:t>
+            </a:r>
+            <a:r>
+              <a:rPr lang="en-GB" dirty="0" err="1"/>
+              <a:t>github</a:t>
+            </a:r>
+            <a:endParaRPr lang="en-GB" dirty="0"/>
+          </a:p>
+          <a:p>
+            <a:r>
+              <a:rPr lang="en-GB" dirty="0"/>
+              <a:t>On your local computer, add a new file itbooks.txt with three titles of information technology books.</a:t>
+            </a:r>
+          </a:p>
+          <a:p>
+            <a:r>
+              <a:rPr lang="en-GB" dirty="0"/>
+              <a:t>Commit changes and try to push the repo to the </a:t>
+            </a:r>
+            <a:r>
+              <a:rPr lang="en-GB" dirty="0" err="1"/>
+              <a:t>github</a:t>
+            </a:r>
+            <a:r>
+              <a:rPr lang="en-GB" dirty="0"/>
+              <a:t>. Why is that not possible?</a:t>
+            </a:r>
+          </a:p>
+          <a:p>
+            <a:r>
+              <a:rPr lang="en-GB" dirty="0"/>
+              <a:t>Fetch the repo from the </a:t>
+            </a:r>
+            <a:r>
+              <a:rPr lang="en-GB" dirty="0" err="1"/>
+              <a:t>github</a:t>
+            </a:r>
+            <a:r>
+              <a:rPr lang="en-GB" dirty="0"/>
+              <a:t>, merge it with your local one, and then push the repo to the </a:t>
+            </a:r>
+            <a:r>
+              <a:rPr lang="en-GB" dirty="0" err="1"/>
+              <a:t>github</a:t>
             </a:r>
             <a:r>
               <a:rPr lang="en-GB" dirty="0"/>
@@ -6302,72 +6503,22 @@
           <a:p>
             <a:r>
               <a:rPr lang="en-GB" dirty="0"/>
-              <a:t>Display branch list. What is the name of the default branch?</a:t>
-            </a:r>
-          </a:p>
-          <a:p>
+              <a:t>Check the final repo content on the </a:t>
+            </a:r>
+            <a:r>
+              <a:rPr lang="en-GB" dirty="0" err="1"/>
+              <a:t>github</a:t>
+            </a:r>
             <a:r>
               <a:rPr lang="en-GB" dirty="0"/>
-              <a:t>Add a new branch ‘interests’. Then display branch list (please note that only one branch is active).</a:t>
-            </a:r>
-          </a:p>
-          <a:p>
-            <a:r>
-              <a:rPr lang="en-GB" dirty="0"/>
-              <a:t>Switch to ‘interests’ branch.</a:t>
-            </a:r>
-          </a:p>
-          <a:p>
-            <a:r>
-              <a:rPr lang="en-GB" dirty="0"/>
-              <a:t>Add new file myinterests.txt. Type two-three sentences about your hobby.</a:t>
-            </a:r>
-          </a:p>
-          <a:p>
-            <a:r>
-              <a:rPr lang="en-GB" dirty="0"/>
-              <a:t>Commit changes.</a:t>
-            </a:r>
-            <a:endParaRPr lang="pl-PL" dirty="0"/>
-          </a:p>
-          <a:p>
-            <a:r>
-              <a:rPr lang="en-GB" dirty="0"/>
-              <a:t>Switch between ‘master’ and ‘interests’ branches. Can you see the differences in the working directory?</a:t>
-            </a:r>
-          </a:p>
-          <a:p>
-            <a:r>
-              <a:rPr lang="en-GB" dirty="0"/>
-              <a:t>Merge ‘interests’ branch into ‘master’.</a:t>
-            </a:r>
-          </a:p>
-          <a:p>
-            <a:r>
-              <a:rPr lang="en-GB" dirty="0"/>
-              <a:t>Check the differences in the working directory.</a:t>
-            </a:r>
-          </a:p>
-          <a:p>
-            <a:r>
-              <a:rPr lang="en-GB" dirty="0"/>
-              <a:t>Remove ‘interests’ branch.</a:t>
-            </a:r>
-          </a:p>
-          <a:p>
-            <a:r>
-              <a:rPr lang="en-US" dirty="0"/>
-              <a:t>Push changes from local to remote repository (</a:t>
-            </a:r>
-            <a:r>
-              <a:rPr lang="en-US" dirty="0" err="1"/>
-              <a:t>github</a:t>
-            </a:r>
-            <a:r>
-              <a:rPr lang="en-US" dirty="0"/>
-              <a:t>) and check the remote repo content.</a:t>
-            </a:r>
+              <a:t>.</a:t>
+            </a:r>
+          </a:p>
+          <a:p>
             <a:endParaRPr lang="en-GB" dirty="0"/>
+          </a:p>
+          <a:p>
+            <a:endParaRPr lang="pl-PL" dirty="0"/>
           </a:p>
         </p:txBody>
       </p:sp>
@@ -6411,7 +6562,7 @@
           <a:p>
             <a:r>
               <a:rPr lang="en-GB" dirty="0"/>
-              <a:t>Create and merge branches </a:t>
+              <a:t>Collaborate on project</a:t>
             </a:r>
             <a:endParaRPr lang="pl-PL" dirty="0"/>
           </a:p>
@@ -6420,7 +6571,7 @@
     </p:spTree>
     <p:extLst>
       <p:ext uri="{BB962C8B-B14F-4D97-AF65-F5344CB8AC3E}">
-        <p14:creationId xmlns:p14="http://schemas.microsoft.com/office/powerpoint/2010/main" val="1651116503"/>
+        <p14:creationId xmlns:p14="http://schemas.microsoft.com/office/powerpoint/2010/main" val="3563571028"/>
       </p:ext>
     </p:extLst>
   </p:cSld>
@@ -6459,26 +6610,24 @@
         </p:nvSpPr>
         <p:spPr/>
         <p:txBody>
-          <a:bodyPr>
-            <a:normAutofit lnSpcReduction="10000"/>
-          </a:bodyPr>
+          <a:bodyPr/>
           <a:lstStyle/>
           <a:p>
             <a:r>
               <a:rPr lang="en-GB" dirty="0"/>
-              <a:t>On your local computer, create a new repository Books.</a:t>
+              <a:t>Create a completely new git repository with at least three files, one of them should be authors.txt.</a:t>
             </a:r>
           </a:p>
           <a:p>
             <a:r>
               <a:rPr lang="en-GB" dirty="0"/>
-              <a:t>In the repo, add a new file books.txt with your three favourite book titles, on separate lines.</a:t>
+              <a:t>Add your colleague as a collaborator.</a:t>
             </a:r>
           </a:p>
           <a:p>
             <a:r>
               <a:rPr lang="en-GB" dirty="0"/>
-              <a:t>Commit changes and push the repo to the </a:t>
+              <a:t>With your collaborator, complete the authors.txt with your name and surname in the same time. Then you and your collaborator try pushing changes on the </a:t>
             </a:r>
             <a:r>
               <a:rPr lang="en-GB" dirty="0" err="1"/>
@@ -6486,109 +6635,28 @@
             </a:r>
             <a:r>
               <a:rPr lang="en-GB" dirty="0"/>
-              <a:t>. Make sure to create an empty remote repo before.</a:t>
-            </a:r>
-          </a:p>
-          <a:p>
+              <a:t>.</a:t>
+            </a:r>
+          </a:p>
+          <a:p>
+            <a:pPr lvl="1"/>
             <a:r>
               <a:rPr lang="en-GB" dirty="0"/>
-              <a:t>On the </a:t>
-            </a:r>
-            <a:r>
-              <a:rPr lang="en-GB" dirty="0" err="1"/>
-              <a:t>github</a:t>
-            </a:r>
+              <a:t>How to compare and display differences between the two versions of authors.txt?</a:t>
+            </a:r>
+          </a:p>
+          <a:p>
+            <a:pPr lvl="1"/>
             <a:r>
               <a:rPr lang="en-GB" dirty="0"/>
-              <a:t>, add your colleague as the repository collaborator.</a:t>
-            </a:r>
-          </a:p>
-          <a:p>
+              <a:t>How to resolve the conflict?</a:t>
+            </a:r>
+          </a:p>
+          <a:p>
+            <a:pPr lvl="1"/>
             <a:r>
               <a:rPr lang="en-GB" dirty="0"/>
-              <a:t>Ask your collaborator to</a:t>
-            </a:r>
-          </a:p>
-          <a:p>
-            <a:pPr lvl="1"/>
-            <a:r>
-              <a:rPr lang="en-GB" dirty="0"/>
-              <a:t>clone the repository</a:t>
-            </a:r>
-          </a:p>
-          <a:p>
-            <a:pPr lvl="1"/>
-            <a:r>
-              <a:rPr lang="en-GB" dirty="0"/>
-              <a:t>add bookstores.txt with two names and URLs of the Internet bookstores</a:t>
-            </a:r>
-          </a:p>
-          <a:p>
-            <a:pPr lvl="1"/>
-            <a:r>
-              <a:rPr lang="en-GB" dirty="0"/>
-              <a:t>commit changes and push them to the </a:t>
-            </a:r>
-            <a:r>
-              <a:rPr lang="en-GB" dirty="0" err="1"/>
-              <a:t>github</a:t>
-            </a:r>
-            <a:endParaRPr lang="en-GB" dirty="0"/>
-          </a:p>
-          <a:p>
-            <a:r>
-              <a:rPr lang="en-GB" dirty="0"/>
-              <a:t>On your local computer, add a new file itbooks.txt with three titles of information technology books.</a:t>
-            </a:r>
-          </a:p>
-          <a:p>
-            <a:r>
-              <a:rPr lang="en-GB" dirty="0"/>
-              <a:t>Commit changes and try to push the repo to the </a:t>
-            </a:r>
-            <a:r>
-              <a:rPr lang="en-GB" dirty="0" err="1"/>
-              <a:t>github</a:t>
-            </a:r>
-            <a:r>
-              <a:rPr lang="en-GB" dirty="0"/>
-              <a:t>. Why is that not possible?</a:t>
-            </a:r>
-          </a:p>
-          <a:p>
-            <a:r>
-              <a:rPr lang="en-GB" dirty="0"/>
-              <a:t>Fetch the repo from the </a:t>
-            </a:r>
-            <a:r>
-              <a:rPr lang="en-GB" dirty="0" err="1"/>
-              <a:t>github</a:t>
-            </a:r>
-            <a:r>
-              <a:rPr lang="en-GB" dirty="0"/>
-              <a:t>, merge it with your local one, and then push the repo to the </a:t>
-            </a:r>
-            <a:r>
-              <a:rPr lang="en-GB" dirty="0" err="1"/>
-              <a:t>github</a:t>
-            </a:r>
-            <a:r>
-              <a:rPr lang="en-GB" dirty="0"/>
-              <a:t>.</a:t>
-            </a:r>
-          </a:p>
-          <a:p>
-            <a:r>
-              <a:rPr lang="en-GB" dirty="0"/>
-              <a:t>Check the final repo content on the </a:t>
-            </a:r>
-            <a:r>
-              <a:rPr lang="en-GB" dirty="0" err="1"/>
-              <a:t>github</a:t>
-            </a:r>
-            <a:r>
-              <a:rPr lang="en-GB" dirty="0"/>
-              <a:t>.</a:t>
+              <a:t>Try to find a solution in the Pro Git book, git manual or on the Internet.</a:t>
             </a:r>
           </a:p>
           <a:p>
@@ -6639,7 +6707,7 @@
           <a:p>
             <a:r>
               <a:rPr lang="en-GB" dirty="0"/>
-              <a:t>Collaborate on project</a:t>
+              <a:t>Resolve conflicts</a:t>
             </a:r>
             <a:endParaRPr lang="pl-PL" dirty="0"/>
           </a:p>
@@ -6648,7 +6716,7 @@
     </p:spTree>
     <p:extLst>
       <p:ext uri="{BB962C8B-B14F-4D97-AF65-F5344CB8AC3E}">
-        <p14:creationId xmlns:p14="http://schemas.microsoft.com/office/powerpoint/2010/main" val="3563571028"/>
+        <p14:creationId xmlns:p14="http://schemas.microsoft.com/office/powerpoint/2010/main" val="1922991775"/>
       </p:ext>
     </p:extLst>
   </p:cSld>
@@ -6687,60 +6755,83 @@
         </p:nvSpPr>
         <p:spPr/>
         <p:txBody>
-          <a:bodyPr/>
+          <a:bodyPr>
+            <a:normAutofit/>
+          </a:bodyPr>
           <a:lstStyle/>
           <a:p>
             <a:r>
               <a:rPr lang="en-GB" dirty="0"/>
-              <a:t>Create a completely new git repository with at least three files, one of them should be authors.txt.</a:t>
+              <a:t>Create a folder with three files. You can copy and paste any existing files.</a:t>
             </a:r>
           </a:p>
           <a:p>
             <a:r>
               <a:rPr lang="en-GB" dirty="0"/>
-              <a:t>Add your colleague as a collaborator.</a:t>
+              <a:t>Initialise a local git repository in the created folder.</a:t>
             </a:r>
           </a:p>
           <a:p>
             <a:r>
               <a:rPr lang="en-GB" dirty="0"/>
-              <a:t>With your collaborator, complete the authors.txt with your name and surname in the same time. Then you and your collaborator try pushing changes on the </a:t>
-            </a:r>
-            <a:r>
-              <a:rPr lang="en-GB" dirty="0" err="1"/>
-              <a:t>github</a:t>
-            </a:r>
+              <a:t>Start tracking the files, and then show repository status.</a:t>
+            </a:r>
+          </a:p>
+          <a:p>
             <a:r>
               <a:rPr lang="en-GB" dirty="0"/>
-              <a:t>.</a:t>
-            </a:r>
-          </a:p>
-          <a:p>
-            <a:pPr lvl="1"/>
+              <a:t>Commit changes . Use ‘Repo with 3 files’ message. Then show commit logs.</a:t>
+            </a:r>
+          </a:p>
+          <a:p>
             <a:r>
               <a:rPr lang="en-GB" dirty="0"/>
-              <a:t>How to compare and display differences between the two versions of authors.txt?</a:t>
-            </a:r>
-          </a:p>
-          <a:p>
-            <a:pPr lvl="1"/>
+              <a:t>Add to the folder a file.</a:t>
+            </a:r>
+          </a:p>
+          <a:p>
             <a:r>
               <a:rPr lang="en-GB" dirty="0"/>
-              <a:t>How to resolve the conflict?</a:t>
-            </a:r>
-          </a:p>
-          <a:p>
-            <a:pPr lvl="1"/>
+              <a:t>Start tracking this file and commit changes . Use ‘Repo with 4 files’ message. Then show commit logs.</a:t>
+            </a:r>
+          </a:p>
+          <a:p>
             <a:r>
               <a:rPr lang="en-GB" dirty="0"/>
-              <a:t>Try to find a solution in the Pro Git book, git manual or on the Internet.</a:t>
-            </a:r>
-          </a:p>
-          <a:p>
-            <a:endParaRPr lang="en-GB" dirty="0"/>
-          </a:p>
-          <a:p>
-            <a:endParaRPr lang="pl-PL" dirty="0"/>
+              <a:t>Add to the folder a file.</a:t>
+            </a:r>
+          </a:p>
+          <a:p>
+            <a:r>
+              <a:rPr lang="en-GB" dirty="0"/>
+              <a:t>Start tracking this file and commit changes . Use ‘Repo with 5 files’ message. Then show commit logs.</a:t>
+            </a:r>
+          </a:p>
+          <a:p>
+            <a:r>
+              <a:rPr lang="en-GB" dirty="0"/>
+              <a:t>Roll back last</a:t>
+            </a:r>
+            <a:r>
+              <a:rPr lang="pl-PL" dirty="0"/>
+              <a:t> </a:t>
+            </a:r>
+            <a:r>
+              <a:rPr lang="en-GB" dirty="0"/>
+              <a:t>two changes</a:t>
+            </a:r>
+            <a:r>
+              <a:rPr lang="pl-PL" dirty="0"/>
+              <a:t> (</a:t>
+            </a:r>
+            <a:r>
+              <a:rPr lang="en-GB" dirty="0"/>
+              <a:t>adding two files</a:t>
+            </a:r>
+            <a:r>
+              <a:rPr lang="pl-PL" dirty="0"/>
+              <a:t>).</a:t>
+            </a:r>
           </a:p>
         </p:txBody>
       </p:sp>
@@ -6784,16 +6875,15 @@
           <a:p>
             <a:r>
               <a:rPr lang="en-GB" dirty="0"/>
-              <a:t>Resolve conflicts</a:t>
-            </a:r>
-            <a:endParaRPr lang="pl-PL" dirty="0"/>
+              <a:t>Undo changes</a:t>
+            </a:r>
           </a:p>
         </p:txBody>
       </p:sp>
     </p:spTree>
     <p:extLst>
       <p:ext uri="{BB962C8B-B14F-4D97-AF65-F5344CB8AC3E}">
-        <p14:creationId xmlns:p14="http://schemas.microsoft.com/office/powerpoint/2010/main" val="1922991775"/>
+        <p14:creationId xmlns:p14="http://schemas.microsoft.com/office/powerpoint/2010/main" val="2245884477"/>
       </p:ext>
     </p:extLst>
   </p:cSld>
@@ -6822,7 +6912,7 @@
       </p:grpSpPr>
       <p:sp>
         <p:nvSpPr>
-          <p:cNvPr id="2" name="Symbol zastępczy zawartości 1"/>
+          <p:cNvPr id="6" name="Symbol zastępczy zawartości 5"/>
           <p:cNvSpPr>
             <a:spLocks noGrp="1"/>
           </p:cNvSpPr>
@@ -6832,89 +6922,210 @@
         </p:nvSpPr>
         <p:spPr/>
         <p:txBody>
-          <a:bodyPr>
-            <a:normAutofit/>
-          </a:bodyPr>
-          <a:lstStyle/>
-          <a:p>
-            <a:r>
-              <a:rPr lang="en-GB" dirty="0"/>
-              <a:t>Create a folder with three files. You can copy and paste any existing files.</a:t>
-            </a:r>
-          </a:p>
-          <a:p>
-            <a:r>
-              <a:rPr lang="en-GB" dirty="0"/>
-              <a:t>Initialise a local git repository in the created folder.</a:t>
-            </a:r>
-          </a:p>
-          <a:p>
-            <a:r>
-              <a:rPr lang="en-GB" dirty="0"/>
-              <a:t>Start tracking the files, and then show repository status.</a:t>
-            </a:r>
-          </a:p>
-          <a:p>
-            <a:r>
-              <a:rPr lang="en-GB" dirty="0"/>
-              <a:t>Commit changes . Use ‘Repo with 3 files’ message. Then show commit logs.</a:t>
-            </a:r>
-          </a:p>
-          <a:p>
-            <a:r>
-              <a:rPr lang="en-GB" dirty="0"/>
-              <a:t>Add to the folder a file.</a:t>
-            </a:r>
-          </a:p>
-          <a:p>
-            <a:r>
-              <a:rPr lang="en-GB" dirty="0"/>
-              <a:t>Start tracking this file and commit changes . Use ‘Repo with 4 files’ message. Then show commit logs.</a:t>
-            </a:r>
-          </a:p>
-          <a:p>
-            <a:r>
-              <a:rPr lang="en-GB" dirty="0"/>
-              <a:t>Add to the folder a file.</a:t>
-            </a:r>
-          </a:p>
-          <a:p>
-            <a:r>
-              <a:rPr lang="en-GB" dirty="0"/>
-              <a:t>Start tracking this file and commit changes . Use ‘Repo with 5 files’ message. Then show commit logs.</a:t>
-            </a:r>
-          </a:p>
-          <a:p>
-            <a:r>
-              <a:rPr lang="en-GB" dirty="0"/>
-              <a:t>Roll back last</a:t>
+          <a:bodyPr/>
+          <a:lstStyle/>
+          <a:p>
+            <a:r>
+              <a:rPr lang="pl-PL" dirty="0" err="1"/>
+              <a:t>Familiarise</a:t>
             </a:r>
             <a:r>
               <a:rPr lang="pl-PL" dirty="0"/>
               <a:t> </a:t>
             </a:r>
             <a:r>
-              <a:rPr lang="en-GB" dirty="0"/>
-              <a:t>two changes</a:t>
+              <a:rPr lang="pl-PL" dirty="0" err="1"/>
+              <a:t>yourself</a:t>
+            </a:r>
+            <a:r>
+              <a:rPr lang="pl-PL" dirty="0"/>
+              <a:t> with the Git-</a:t>
+            </a:r>
+            <a:r>
+              <a:rPr lang="pl-PL" dirty="0" err="1"/>
+              <a:t>it</a:t>
+            </a:r>
+            <a:r>
+              <a:rPr lang="pl-PL" dirty="0"/>
+              <a:t> tutorial</a:t>
+            </a:r>
+          </a:p>
+          <a:p>
+            <a:pPr lvl="1"/>
+            <a:r>
+              <a:rPr lang="en-GB" dirty="0">
+                <a:hlinkClick r:id="rId2"/>
+              </a:rPr>
+              <a:t>https://try.github.io/</a:t>
+            </a:r>
+            <a:endParaRPr lang="pl-PL" dirty="0"/>
+          </a:p>
+          <a:p>
+            <a:r>
+              <a:rPr lang="pl-PL" noProof="0" dirty="0" err="1"/>
+              <a:t>Download</a:t>
+            </a:r>
+            <a:r>
+              <a:rPr lang="pl-PL" noProof="0" dirty="0"/>
+              <a:t> and </a:t>
+            </a:r>
+            <a:r>
+              <a:rPr lang="pl-PL" noProof="0" dirty="0" err="1"/>
+              <a:t>unzip</a:t>
+            </a:r>
+            <a:r>
+              <a:rPr lang="pl-PL" noProof="0" dirty="0"/>
+              <a:t> the </a:t>
+            </a:r>
+            <a:r>
+              <a:rPr lang="pl-PL" noProof="0" dirty="0" err="1"/>
+              <a:t>Gi</a:t>
+            </a:r>
+            <a:r>
+              <a:rPr lang="pl-PL" dirty="0"/>
+              <a:t>t-</a:t>
+            </a:r>
+            <a:r>
+              <a:rPr lang="pl-PL" dirty="0" err="1"/>
+              <a:t>it</a:t>
+            </a:r>
+            <a:r>
+              <a:rPr lang="pl-PL" dirty="0"/>
+              <a:t> </a:t>
+            </a:r>
+            <a:r>
+              <a:rPr lang="pl-PL" dirty="0" err="1"/>
+              <a:t>app</a:t>
+            </a:r>
+            <a:endParaRPr lang="pl-PL" dirty="0"/>
+          </a:p>
+          <a:p>
+            <a:pPr lvl="1"/>
+            <a:r>
+              <a:rPr lang="pl-PL" dirty="0" err="1"/>
+              <a:t>You</a:t>
+            </a:r>
+            <a:r>
+              <a:rPr lang="pl-PL" dirty="0"/>
+              <a:t> </a:t>
+            </a:r>
+            <a:r>
+              <a:rPr lang="pl-PL" dirty="0" err="1"/>
+              <a:t>can</a:t>
+            </a:r>
+            <a:r>
+              <a:rPr lang="pl-PL" dirty="0"/>
+              <a:t> </a:t>
+            </a:r>
+            <a:r>
+              <a:rPr lang="pl-PL" dirty="0" err="1"/>
+              <a:t>find</a:t>
+            </a:r>
+            <a:r>
+              <a:rPr lang="pl-PL" dirty="0"/>
+              <a:t> the </a:t>
+            </a:r>
+            <a:r>
+              <a:rPr lang="pl-PL" dirty="0" err="1"/>
+              <a:t>app</a:t>
+            </a:r>
+            <a:r>
+              <a:rPr lang="pl-PL" dirty="0"/>
+              <a:t> in the section: </a:t>
+            </a:r>
+            <a:r>
+              <a:rPr lang="pl-PL" dirty="0" err="1"/>
+              <a:t>What</a:t>
+            </a:r>
+            <a:r>
+              <a:rPr lang="pl-PL" dirty="0"/>
+              <a:t> to </a:t>
+            </a:r>
+            <a:r>
+              <a:rPr lang="pl-PL" dirty="0" err="1"/>
+              <a:t>Install</a:t>
+            </a:r>
+            <a:r>
+              <a:rPr lang="pl-PL" dirty="0"/>
+              <a:t> | Git-</a:t>
+            </a:r>
+            <a:r>
+              <a:rPr lang="pl-PL" dirty="0" err="1"/>
+              <a:t>it</a:t>
             </a:r>
             <a:r>
               <a:rPr lang="pl-PL" dirty="0"/>
               <a:t> (</a:t>
             </a:r>
             <a:r>
-              <a:rPr lang="en-GB" dirty="0"/>
-              <a:t>adding two files</a:t>
+              <a:rPr lang="pl-PL" dirty="0" err="1"/>
+              <a:t>releases</a:t>
             </a:r>
             <a:r>
               <a:rPr lang="pl-PL" dirty="0"/>
-              <a:t>).</a:t>
-            </a:r>
-          </a:p>
-        </p:txBody>
-      </p:sp>
-      <p:sp>
-        <p:nvSpPr>
-          <p:cNvPr id="3" name="Symbol zastępczy numeru slajdu 2"/>
+              <a:t>)</a:t>
+            </a:r>
+          </a:p>
+          <a:p>
+            <a:r>
+              <a:rPr lang="pl-PL" dirty="0"/>
+              <a:t>Move on to the Get </a:t>
+            </a:r>
+            <a:r>
+              <a:rPr lang="pl-PL" dirty="0" err="1"/>
+              <a:t>started</a:t>
+            </a:r>
+            <a:r>
+              <a:rPr lang="pl-PL" dirty="0"/>
+              <a:t> section and face </a:t>
+            </a:r>
+            <a:r>
+              <a:rPr lang="pl-PL" dirty="0" err="1"/>
+              <a:t>all</a:t>
+            </a:r>
+            <a:r>
+              <a:rPr lang="pl-PL" dirty="0"/>
+              <a:t> the </a:t>
+            </a:r>
+            <a:r>
+              <a:rPr lang="pl-PL" dirty="0" err="1"/>
+              <a:t>challenges</a:t>
+            </a:r>
+            <a:r>
+              <a:rPr lang="pl-PL" dirty="0"/>
+              <a:t> </a:t>
+            </a:r>
+            <a:r>
+              <a:rPr lang="pl-PL" dirty="0" err="1"/>
+              <a:t>contained</a:t>
+            </a:r>
+            <a:r>
+              <a:rPr lang="pl-PL" dirty="0"/>
+              <a:t> in the Git-</a:t>
+            </a:r>
+            <a:r>
+              <a:rPr lang="pl-PL" dirty="0" err="1"/>
+              <a:t>it</a:t>
+            </a:r>
+            <a:r>
+              <a:rPr lang="pl-PL" dirty="0"/>
+              <a:t> </a:t>
+            </a:r>
+            <a:r>
+              <a:rPr lang="pl-PL" dirty="0" err="1"/>
+              <a:t>app</a:t>
+            </a:r>
+            <a:endParaRPr lang="pl-PL" dirty="0"/>
+          </a:p>
+          <a:p>
+            <a:pPr lvl="1"/>
+            <a:endParaRPr lang="en-GB" noProof="0" dirty="0"/>
+          </a:p>
+        </p:txBody>
+      </p:sp>
+      <p:sp>
+        <p:nvSpPr>
+          <p:cNvPr id="4" name="Symbol zastępczy numeru slajdu 3"/>
           <p:cNvSpPr>
             <a:spLocks noGrp="1"/>
           </p:cNvSpPr>
@@ -6937,7 +7148,7 @@
       </p:sp>
       <p:sp>
         <p:nvSpPr>
-          <p:cNvPr id="4" name="Tytuł 3"/>
+          <p:cNvPr id="5" name="Tytuł 4"/>
           <p:cNvSpPr>
             <a:spLocks noGrp="1"/>
           </p:cNvSpPr>
@@ -6951,16 +7162,25 @@
           <a:lstStyle/>
           <a:p>
             <a:r>
-              <a:rPr lang="en-GB" dirty="0"/>
-              <a:t>Undo changes</a:t>
-            </a:r>
+              <a:rPr lang="pl-PL" noProof="0" dirty="0"/>
+              <a:t>Git-</a:t>
+            </a:r>
+            <a:r>
+              <a:rPr lang="pl-PL" noProof="0" dirty="0" err="1"/>
+              <a:t>it</a:t>
+            </a:r>
+            <a:r>
+              <a:rPr lang="pl-PL" noProof="0" dirty="0"/>
+              <a:t> tutorial</a:t>
+            </a:r>
+            <a:endParaRPr lang="en-GB" noProof="0" dirty="0"/>
           </a:p>
         </p:txBody>
       </p:sp>
     </p:spTree>
     <p:extLst>
       <p:ext uri="{BB962C8B-B14F-4D97-AF65-F5344CB8AC3E}">
-        <p14:creationId xmlns:p14="http://schemas.microsoft.com/office/powerpoint/2010/main" val="2245884477"/>
+        <p14:creationId xmlns:p14="http://schemas.microsoft.com/office/powerpoint/2010/main" val="1205715426"/>
       </p:ext>
     </p:extLst>
   </p:cSld>
@@ -7086,7 +7306,6 @@
               <a:rPr lang="pl-PL" sz="1400" dirty="0"/>
               <a:t>https://git-scm.com/doc</a:t>
             </a:r>
-            <a:endParaRPr lang="pl-PL" sz="1400" dirty="0"/>
           </a:p>
         </p:txBody>
       </p:sp>
@@ -7243,7 +7462,6 @@
               <a:rPr lang="pl-PL" sz="1400" dirty="0"/>
               <a:t>https://git-scm.com/doc</a:t>
             </a:r>
-            <a:endParaRPr lang="pl-PL" sz="1400" dirty="0"/>
           </a:p>
         </p:txBody>
       </p:sp>

</xml_diff>